<commit_message>
04/16/2020 15:11 - classe dispositivo pronta ...
</commit_message>
<xml_diff>
--- a/projeto/classes, métodos, estrutura lógica e exemplificação.pptx
+++ b/projeto/classes, métodos, estrutura lógica e exemplificação.pptx
@@ -9,8 +9,9 @@
     <p:sldId id="256" r:id="rId3"/>
     <p:sldId id="258" r:id="rId4"/>
     <p:sldId id="260" r:id="rId5"/>
-    <p:sldId id="263" r:id="rId6"/>
-    <p:sldId id="264" r:id="rId7"/>
+    <p:sldId id="265" r:id="rId6"/>
+    <p:sldId id="263" r:id="rId7"/>
+    <p:sldId id="264" r:id="rId8"/>
   </p:sldIdLst>
   <p:sldSz cx="12192000" cy="6858000"/>
   <p:notesSz cx="6858000" cy="9144000"/>
@@ -109,6 +110,11 @@
       </a:defRPr>
     </a:lvl9pPr>
   </p:defaultTextStyle>
+  <p:extLst>
+    <p:ext uri="{EFAFB233-063F-42B5-8137-9DF3F51BA10A}">
+      <p15:sldGuideLst xmlns:p15="http://schemas.microsoft.com/office/powerpoint/2012/main"/>
+    </p:ext>
+  </p:extLst>
 </p:presentation>
 </file>
 
@@ -4046,18 +4052,7 @@
               <a:rPr lang="en-US" sz="2800" i="1" dirty="0" err="1"/>
               <a:t>Usuário</a:t>
             </a:r>
-            <a:r>
-              <a:rPr lang="en-US" sz="2800" i="1" dirty="0"/>
-              <a:t> (</a:t>
-            </a:r>
-            <a:r>
-              <a:rPr lang="en-US" sz="2800" i="1" dirty="0" err="1"/>
-              <a:t>Habitualidade</a:t>
-            </a:r>
-            <a:r>
-              <a:rPr lang="en-US" sz="2800" i="1" dirty="0"/>
-              <a:t>)</a:t>
-            </a:r>
+            <a:endParaRPr lang="en-US" sz="2800" i="1" dirty="0"/>
           </a:p>
         </p:txBody>
       </p:sp>
@@ -4403,18 +4398,7 @@
               <a:rPr lang="en-US" sz="2800" i="1" dirty="0" err="1"/>
               <a:t>Ambiente</a:t>
             </a:r>
-            <a:r>
-              <a:rPr lang="en-US" sz="2800" i="1" dirty="0"/>
-              <a:t> (</a:t>
-            </a:r>
-            <a:r>
-              <a:rPr lang="en-US" sz="2800" i="1" dirty="0" err="1"/>
-              <a:t>Habitualidade</a:t>
-            </a:r>
-            <a:r>
-              <a:rPr lang="en-US" sz="2800" i="1" dirty="0"/>
-              <a:t>)</a:t>
-            </a:r>
+            <a:endParaRPr lang="en-US" sz="2800" i="1" dirty="0"/>
           </a:p>
         </p:txBody>
       </p:sp>
@@ -4789,18 +4773,7 @@
               <a:rPr lang="en-US" sz="2800" i="1" dirty="0" err="1"/>
               <a:t>Dispositivo</a:t>
             </a:r>
-            <a:r>
-              <a:rPr lang="en-US" sz="2800" i="1" dirty="0"/>
-              <a:t> (</a:t>
-            </a:r>
-            <a:r>
-              <a:rPr lang="en-US" sz="2800" i="1" dirty="0" err="1"/>
-              <a:t>Habitualidade</a:t>
-            </a:r>
-            <a:r>
-              <a:rPr lang="en-US" sz="2800" i="1" dirty="0"/>
-              <a:t>)</a:t>
-            </a:r>
+            <a:endParaRPr lang="en-US" sz="2800" i="1" dirty="0"/>
           </a:p>
         </p:txBody>
       </p:sp>
@@ -4834,6 +4807,392 @@
           <a:chExt cx="0" cy="0"/>
         </a:xfrm>
       </p:grpSpPr>
+      <p:sp>
+        <p:nvSpPr>
+          <p:cNvPr id="5" name="Retângulo: Cantos Arredondados 4">
+            <a:extLst>
+              <a:ext uri="{FF2B5EF4-FFF2-40B4-BE49-F238E27FC236}">
+                <a16:creationId xmlns:a16="http://schemas.microsoft.com/office/drawing/2014/main" id="{BD641F90-858B-4188-8B33-0BD0B798E819}"/>
+              </a:ext>
+            </a:extLst>
+          </p:cNvPr>
+          <p:cNvSpPr/>
+          <p:nvPr/>
+        </p:nvSpPr>
+        <p:spPr>
+          <a:xfrm>
+            <a:off x="4147930" y="1550504"/>
+            <a:ext cx="3896140" cy="4253948"/>
+          </a:xfrm>
+          <a:prstGeom prst="roundRect">
+            <a:avLst/>
+          </a:prstGeom>
+          <a:solidFill>
+            <a:schemeClr val="bg2"/>
+          </a:solidFill>
+        </p:spPr>
+        <p:style>
+          <a:lnRef idx="2">
+            <a:schemeClr val="accent1">
+              <a:shade val="50000"/>
+            </a:schemeClr>
+          </a:lnRef>
+          <a:fillRef idx="1">
+            <a:schemeClr val="accent1"/>
+          </a:fillRef>
+          <a:effectRef idx="0">
+            <a:schemeClr val="accent1"/>
+          </a:effectRef>
+          <a:fontRef idx="minor">
+            <a:schemeClr val="lt1"/>
+          </a:fontRef>
+        </p:style>
+        <p:txBody>
+          <a:bodyPr rtlCol="0" anchor="ctr"/>
+          <a:lstStyle/>
+          <a:p>
+            <a:pPr algn="ctr"/>
+            <a:endParaRPr lang="en-US" dirty="0"/>
+          </a:p>
+        </p:txBody>
+      </p:sp>
+      <p:sp>
+        <p:nvSpPr>
+          <p:cNvPr id="6" name="CaixaDeTexto 5">
+            <a:extLst>
+              <a:ext uri="{FF2B5EF4-FFF2-40B4-BE49-F238E27FC236}">
+                <a16:creationId xmlns:a16="http://schemas.microsoft.com/office/drawing/2014/main" id="{A8026BCA-9E16-47E3-8FB3-01CE5483C443}"/>
+              </a:ext>
+            </a:extLst>
+          </p:cNvPr>
+          <p:cNvSpPr txBox="1"/>
+          <p:nvPr/>
+        </p:nvSpPr>
+        <p:spPr>
+          <a:xfrm flipH="1">
+            <a:off x="4147930" y="1643269"/>
+            <a:ext cx="3896140" cy="461665"/>
+          </a:xfrm>
+          <a:prstGeom prst="rect">
+            <a:avLst/>
+          </a:prstGeom>
+          <a:noFill/>
+        </p:spPr>
+        <p:txBody>
+          <a:bodyPr wrap="square" rtlCol="0">
+            <a:spAutoFit/>
+          </a:bodyPr>
+          <a:lstStyle/>
+          <a:p>
+            <a:pPr algn="ctr"/>
+            <a:r>
+              <a:rPr lang="en-US" sz="2400" b="1" dirty="0"/>
+              <a:t>Database</a:t>
+            </a:r>
+            <a:endParaRPr lang="en-US" b="1" dirty="0"/>
+          </a:p>
+        </p:txBody>
+      </p:sp>
+      <p:sp>
+        <p:nvSpPr>
+          <p:cNvPr id="7" name="CaixaDeTexto 6">
+            <a:extLst>
+              <a:ext uri="{FF2B5EF4-FFF2-40B4-BE49-F238E27FC236}">
+                <a16:creationId xmlns:a16="http://schemas.microsoft.com/office/drawing/2014/main" id="{937981E1-485F-420B-B21D-6025CEA94AA5}"/>
+              </a:ext>
+            </a:extLst>
+          </p:cNvPr>
+          <p:cNvSpPr txBox="1"/>
+          <p:nvPr/>
+        </p:nvSpPr>
+        <p:spPr>
+          <a:xfrm flipH="1">
+            <a:off x="4147930" y="2061628"/>
+            <a:ext cx="3896140" cy="2308324"/>
+          </a:xfrm>
+          <a:prstGeom prst="rect">
+            <a:avLst/>
+          </a:prstGeom>
+          <a:noFill/>
+        </p:spPr>
+        <p:txBody>
+          <a:bodyPr wrap="square" rtlCol="0">
+            <a:spAutoFit/>
+          </a:bodyPr>
+          <a:lstStyle/>
+          <a:p>
+            <a:pPr marL="285750" indent="-285750" algn="ctr">
+              <a:buFontTx/>
+              <a:buChar char="-"/>
+            </a:pPr>
+            <a:r>
+              <a:rPr lang="en-US" dirty="0"/>
+              <a:t>Porta</a:t>
+            </a:r>
+          </a:p>
+          <a:p>
+            <a:pPr marL="285750" indent="-285750" algn="ctr">
+              <a:buFontTx/>
+              <a:buChar char="-"/>
+            </a:pPr>
+            <a:r>
+              <a:rPr lang="en-US" dirty="0"/>
+              <a:t>Host</a:t>
+            </a:r>
+          </a:p>
+          <a:p>
+            <a:pPr marL="285750" indent="-285750" algn="ctr">
+              <a:buFontTx/>
+              <a:buChar char="-"/>
+            </a:pPr>
+            <a:r>
+              <a:rPr lang="en-US" dirty="0"/>
+              <a:t>User</a:t>
+            </a:r>
+          </a:p>
+          <a:p>
+            <a:pPr marL="285750" indent="-285750" algn="ctr">
+              <a:buFontTx/>
+              <a:buChar char="-"/>
+            </a:pPr>
+            <a:r>
+              <a:rPr lang="en-US" dirty="0"/>
+              <a:t>Password</a:t>
+            </a:r>
+          </a:p>
+          <a:p>
+            <a:pPr marL="285750" indent="-285750" algn="ctr">
+              <a:buFontTx/>
+              <a:buChar char="-"/>
+            </a:pPr>
+            <a:r>
+              <a:rPr lang="en-US" dirty="0"/>
+              <a:t>Database</a:t>
+            </a:r>
+          </a:p>
+          <a:p>
+            <a:pPr marL="285750" indent="-285750" algn="ctr">
+              <a:buFontTx/>
+              <a:buChar char="-"/>
+            </a:pPr>
+            <a:r>
+              <a:rPr lang="en-US" dirty="0" err="1"/>
+              <a:t>CursorClass</a:t>
+            </a:r>
+            <a:endParaRPr lang="en-US" dirty="0"/>
+          </a:p>
+          <a:p>
+            <a:pPr marL="285750" indent="-285750" algn="ctr">
+              <a:buFontTx/>
+              <a:buChar char="-"/>
+            </a:pPr>
+            <a:r>
+              <a:rPr lang="en-US" dirty="0" err="1"/>
+              <a:t>Enconding</a:t>
+            </a:r>
+            <a:endParaRPr lang="en-US" dirty="0"/>
+          </a:p>
+          <a:p>
+            <a:pPr algn="ctr"/>
+            <a:endParaRPr lang="en-US" dirty="0"/>
+          </a:p>
+        </p:txBody>
+      </p:sp>
+      <p:sp>
+        <p:nvSpPr>
+          <p:cNvPr id="8" name="CaixaDeTexto 7">
+            <a:extLst>
+              <a:ext uri="{FF2B5EF4-FFF2-40B4-BE49-F238E27FC236}">
+                <a16:creationId xmlns:a16="http://schemas.microsoft.com/office/drawing/2014/main" id="{63F7B34C-706D-4765-9B43-10809198EDE1}"/>
+              </a:ext>
+            </a:extLst>
+          </p:cNvPr>
+          <p:cNvSpPr txBox="1"/>
+          <p:nvPr/>
+        </p:nvSpPr>
+        <p:spPr>
+          <a:xfrm flipH="1">
+            <a:off x="4147930" y="4304653"/>
+            <a:ext cx="3896140" cy="923330"/>
+          </a:xfrm>
+          <a:prstGeom prst="rect">
+            <a:avLst/>
+          </a:prstGeom>
+          <a:noFill/>
+        </p:spPr>
+        <p:txBody>
+          <a:bodyPr wrap="square" rtlCol="0">
+            <a:spAutoFit/>
+          </a:bodyPr>
+          <a:lstStyle/>
+          <a:p>
+            <a:pPr marL="285750" indent="-285750" algn="ctr">
+              <a:buFontTx/>
+              <a:buChar char="-"/>
+            </a:pPr>
+            <a:r>
+              <a:rPr lang="en-US" dirty="0" err="1"/>
+              <a:t>ExisteRegistro</a:t>
+            </a:r>
+            <a:endParaRPr lang="en-US" dirty="0"/>
+          </a:p>
+          <a:p>
+            <a:pPr marL="285750" indent="-285750" algn="ctr">
+              <a:buFontTx/>
+              <a:buChar char="-"/>
+            </a:pPr>
+            <a:r>
+              <a:rPr lang="en-US" dirty="0" err="1"/>
+              <a:t>BuscaRegistro</a:t>
+            </a:r>
+            <a:endParaRPr lang="en-US" dirty="0"/>
+          </a:p>
+          <a:p>
+            <a:pPr marL="285750" indent="-285750" algn="ctr">
+              <a:buFontTx/>
+              <a:buChar char="-"/>
+            </a:pPr>
+            <a:r>
+              <a:rPr lang="en-US" dirty="0" err="1"/>
+              <a:t>ContaRegistro</a:t>
+            </a:r>
+            <a:endParaRPr lang="en-US" dirty="0"/>
+          </a:p>
+        </p:txBody>
+      </p:sp>
+      <p:cxnSp>
+        <p:nvCxnSpPr>
+          <p:cNvPr id="10" name="Conector reto 9">
+            <a:extLst>
+              <a:ext uri="{FF2B5EF4-FFF2-40B4-BE49-F238E27FC236}">
+                <a16:creationId xmlns:a16="http://schemas.microsoft.com/office/drawing/2014/main" id="{B5F6F9BF-7EC0-4A63-AFA0-3DC3073E575A}"/>
+              </a:ext>
+            </a:extLst>
+          </p:cNvPr>
+          <p:cNvCxnSpPr>
+            <a:cxnSpLocks/>
+          </p:cNvCxnSpPr>
+          <p:nvPr/>
+        </p:nvCxnSpPr>
+        <p:spPr>
+          <a:xfrm>
+            <a:off x="4147930" y="4145627"/>
+            <a:ext cx="3896140" cy="0"/>
+          </a:xfrm>
+          <a:prstGeom prst="line">
+            <a:avLst/>
+          </a:prstGeom>
+        </p:spPr>
+        <p:style>
+          <a:lnRef idx="1">
+            <a:schemeClr val="dk1"/>
+          </a:lnRef>
+          <a:fillRef idx="0">
+            <a:schemeClr val="dk1"/>
+          </a:fillRef>
+          <a:effectRef idx="0">
+            <a:schemeClr val="dk1"/>
+          </a:effectRef>
+          <a:fontRef idx="minor">
+            <a:schemeClr val="tx1"/>
+          </a:fontRef>
+        </p:style>
+      </p:cxnSp>
+      <p:sp>
+        <p:nvSpPr>
+          <p:cNvPr id="9" name="Retângulo 8">
+            <a:extLst>
+              <a:ext uri="{FF2B5EF4-FFF2-40B4-BE49-F238E27FC236}">
+                <a16:creationId xmlns:a16="http://schemas.microsoft.com/office/drawing/2014/main" id="{3C5CE8C4-0511-45BC-8C46-AE23DFB9E9B5}"/>
+              </a:ext>
+            </a:extLst>
+          </p:cNvPr>
+          <p:cNvSpPr/>
+          <p:nvPr/>
+        </p:nvSpPr>
+        <p:spPr>
+          <a:xfrm>
+            <a:off x="0" y="0"/>
+            <a:ext cx="12192000" cy="914400"/>
+          </a:xfrm>
+          <a:prstGeom prst="rect">
+            <a:avLst/>
+          </a:prstGeom>
+          <a:solidFill>
+            <a:srgbClr val="0070C0"/>
+          </a:solidFill>
+          <a:ln>
+            <a:solidFill>
+              <a:schemeClr val="bg2"/>
+            </a:solidFill>
+          </a:ln>
+        </p:spPr>
+        <p:style>
+          <a:lnRef idx="2">
+            <a:schemeClr val="accent1">
+              <a:shade val="50000"/>
+            </a:schemeClr>
+          </a:lnRef>
+          <a:fillRef idx="1">
+            <a:schemeClr val="accent1"/>
+          </a:fillRef>
+          <a:effectRef idx="0">
+            <a:schemeClr val="accent1"/>
+          </a:effectRef>
+          <a:fontRef idx="minor">
+            <a:schemeClr val="lt1"/>
+          </a:fontRef>
+        </p:style>
+        <p:txBody>
+          <a:bodyPr rtlCol="0" anchor="ctr"/>
+          <a:lstStyle/>
+          <a:p>
+            <a:pPr algn="ctr"/>
+            <a:r>
+              <a:rPr lang="en-US" sz="2800" dirty="0" err="1"/>
+              <a:t>Classe</a:t>
+            </a:r>
+            <a:r>
+              <a:rPr lang="en-US" sz="2800" dirty="0"/>
+              <a:t>: </a:t>
+            </a:r>
+            <a:r>
+              <a:rPr lang="en-US" sz="2800" i="1" dirty="0"/>
+              <a:t>Database</a:t>
+            </a:r>
+          </a:p>
+        </p:txBody>
+      </p:sp>
+    </p:spTree>
+    <p:extLst>
+      <p:ext uri="{BB962C8B-B14F-4D97-AF65-F5344CB8AC3E}">
+        <p14:creationId xmlns:p14="http://schemas.microsoft.com/office/powerpoint/2010/main" val="3025766231"/>
+      </p:ext>
+    </p:extLst>
+  </p:cSld>
+  <p:clrMapOvr>
+    <a:masterClrMapping/>
+  </p:clrMapOvr>
+</p:sld>
+</file>
+
+<file path=ppt/slides/slide6.xml><?xml version="1.0" encoding="utf-8"?>
+<p:sld xmlns:a="http://schemas.openxmlformats.org/drawingml/2006/main" xmlns:r="http://schemas.openxmlformats.org/officeDocument/2006/relationships" xmlns:p="http://schemas.openxmlformats.org/presentationml/2006/main">
+  <p:cSld>
+    <p:spTree>
+      <p:nvGrpSpPr>
+        <p:cNvPr id="1" name=""/>
+        <p:cNvGrpSpPr/>
+        <p:nvPr/>
+      </p:nvGrpSpPr>
+      <p:grpSpPr>
+        <a:xfrm>
+          <a:off x="0" y="0"/>
+          <a:ext cx="0" cy="0"/>
+          <a:chOff x="0" y="0"/>
+          <a:chExt cx="0" cy="0"/>
+        </a:xfrm>
+      </p:grpSpPr>
       <p:pic>
         <p:nvPicPr>
           <p:cNvPr id="11" name="Imagem 10">
@@ -5243,7 +5602,7 @@
 </p:sld>
 </file>
 
-<file path=ppt/slides/slide6.xml><?xml version="1.0" encoding="utf-8"?>
+<file path=ppt/slides/slide7.xml><?xml version="1.0" encoding="utf-8"?>
 <p:sld xmlns:a="http://schemas.openxmlformats.org/drawingml/2006/main" xmlns:r="http://schemas.openxmlformats.org/officeDocument/2006/relationships" xmlns:p="http://schemas.openxmlformats.org/presentationml/2006/main">
   <p:cSld>
     <p:spTree>

</xml_diff>